<commit_message>
Partial varlet constraints - models aren't indexed correctly
</commit_message>
<xml_diff>
--- a/6020_Graph_2/D2D/Week_03 (FBO)/FBO/FBO.pptx
+++ b/6020_Graph_2/D2D/Week_03 (FBO)/FBO/FBO.pptx
@@ -517,7 +517,7 @@
           <a:p>
             <a:fld id="{6FD62889-B4F9-4BAB-9203-1DBCFD1C949F}" type="datetimeFigureOut">
               <a:rPr lang="en-CA" smtClean="0"/>
-              <a:t>2023-01-23</a:t>
+              <a:t>2024-01-25</a:t>
             </a:fld>
             <a:endParaRPr lang="en-CA"/>
           </a:p>
@@ -717,7 +717,7 @@
           <a:p>
             <a:fld id="{6FD62889-B4F9-4BAB-9203-1DBCFD1C949F}" type="datetimeFigureOut">
               <a:rPr lang="en-CA" smtClean="0"/>
-              <a:t>2023-01-23</a:t>
+              <a:t>2024-01-25</a:t>
             </a:fld>
             <a:endParaRPr lang="en-CA"/>
           </a:p>
@@ -927,7 +927,7 @@
           <a:p>
             <a:fld id="{6FD62889-B4F9-4BAB-9203-1DBCFD1C949F}" type="datetimeFigureOut">
               <a:rPr lang="en-CA" smtClean="0"/>
-              <a:t>2023-01-23</a:t>
+              <a:t>2024-01-25</a:t>
             </a:fld>
             <a:endParaRPr lang="en-CA"/>
           </a:p>
@@ -1127,7 +1127,7 @@
           <a:p>
             <a:fld id="{6FD62889-B4F9-4BAB-9203-1DBCFD1C949F}" type="datetimeFigureOut">
               <a:rPr lang="en-CA" smtClean="0"/>
-              <a:t>2023-01-23</a:t>
+              <a:t>2024-01-25</a:t>
             </a:fld>
             <a:endParaRPr lang="en-CA"/>
           </a:p>
@@ -1403,7 +1403,7 @@
           <a:p>
             <a:fld id="{6FD62889-B4F9-4BAB-9203-1DBCFD1C949F}" type="datetimeFigureOut">
               <a:rPr lang="en-CA" smtClean="0"/>
-              <a:t>2023-01-23</a:t>
+              <a:t>2024-01-25</a:t>
             </a:fld>
             <a:endParaRPr lang="en-CA"/>
           </a:p>
@@ -1671,7 +1671,7 @@
           <a:p>
             <a:fld id="{6FD62889-B4F9-4BAB-9203-1DBCFD1C949F}" type="datetimeFigureOut">
               <a:rPr lang="en-CA" smtClean="0"/>
-              <a:t>2023-01-23</a:t>
+              <a:t>2024-01-25</a:t>
             </a:fld>
             <a:endParaRPr lang="en-CA"/>
           </a:p>
@@ -2086,7 +2086,7 @@
           <a:p>
             <a:fld id="{6FD62889-B4F9-4BAB-9203-1DBCFD1C949F}" type="datetimeFigureOut">
               <a:rPr lang="en-CA" smtClean="0"/>
-              <a:t>2023-01-23</a:t>
+              <a:t>2024-01-25</a:t>
             </a:fld>
             <a:endParaRPr lang="en-CA"/>
           </a:p>
@@ -2228,7 +2228,7 @@
           <a:p>
             <a:fld id="{6FD62889-B4F9-4BAB-9203-1DBCFD1C949F}" type="datetimeFigureOut">
               <a:rPr lang="en-CA" smtClean="0"/>
-              <a:t>2023-01-23</a:t>
+              <a:t>2024-01-25</a:t>
             </a:fld>
             <a:endParaRPr lang="en-CA"/>
           </a:p>
@@ -2341,7 +2341,7 @@
           <a:p>
             <a:fld id="{6FD62889-B4F9-4BAB-9203-1DBCFD1C949F}" type="datetimeFigureOut">
               <a:rPr lang="en-CA" smtClean="0"/>
-              <a:t>2023-01-23</a:t>
+              <a:t>2024-01-25</a:t>
             </a:fld>
             <a:endParaRPr lang="en-CA"/>
           </a:p>
@@ -2654,7 +2654,7 @@
           <a:p>
             <a:fld id="{6FD62889-B4F9-4BAB-9203-1DBCFD1C949F}" type="datetimeFigureOut">
               <a:rPr lang="en-CA" smtClean="0"/>
-              <a:t>2023-01-23</a:t>
+              <a:t>2024-01-25</a:t>
             </a:fld>
             <a:endParaRPr lang="en-CA"/>
           </a:p>
@@ -2943,7 +2943,7 @@
           <a:p>
             <a:fld id="{6FD62889-B4F9-4BAB-9203-1DBCFD1C949F}" type="datetimeFigureOut">
               <a:rPr lang="en-CA" smtClean="0"/>
-              <a:t>2023-01-23</a:t>
+              <a:t>2024-01-25</a:t>
             </a:fld>
             <a:endParaRPr lang="en-CA"/>
           </a:p>
@@ -3186,7 +3186,7 @@
           <a:p>
             <a:fld id="{6FD62889-B4F9-4BAB-9203-1DBCFD1C949F}" type="datetimeFigureOut">
               <a:rPr lang="en-CA" smtClean="0"/>
-              <a:t>2023-01-23</a:t>
+              <a:t>2024-01-25</a:t>
             </a:fld>
             <a:endParaRPr lang="en-CA"/>
           </a:p>
@@ -6192,7 +6192,7 @@
         </p:nvSpPr>
         <p:spPr>
           <a:xfrm>
-            <a:off x="3526971" y="4760881"/>
+            <a:off x="3526971" y="4818317"/>
             <a:ext cx="4278086" cy="957943"/>
           </a:xfrm>
           <a:prstGeom prst="rightArrow">
@@ -6403,8 +6403,8 @@
           </a:p>
         </p:txBody>
       </p:sp>
-      <mc:AlternateContent xmlns:mc="http://schemas.openxmlformats.org/markup-compatibility/2006">
-        <mc:Choice xmlns:p14="http://schemas.microsoft.com/office/powerpoint/2010/main" Requires="p14">
+      <mc:AlternateContent xmlns:mc="http://schemas.openxmlformats.org/markup-compatibility/2006" xmlns:p14="http://schemas.microsoft.com/office/powerpoint/2010/main">
+        <mc:Choice Requires="p14">
           <p:contentPart p14:bwMode="auto" r:id="rId2">
             <p14:nvContentPartPr>
               <p14:cNvPr id="17" name="Ink 16">
@@ -6423,7 +6423,7 @@
             </p14:xfrm>
           </p:contentPart>
         </mc:Choice>
-        <mc:Fallback>
+        <mc:Fallback xmlns="">
           <p:pic>
             <p:nvPicPr>
               <p:cNvPr id="17" name="Ink 16">
@@ -6474,8 +6474,8 @@
             <a:chExt cx="2098800" cy="3422520"/>
           </a:xfrm>
         </p:grpSpPr>
-        <mc:AlternateContent xmlns:mc="http://schemas.openxmlformats.org/markup-compatibility/2006">
-          <mc:Choice xmlns:p14="http://schemas.microsoft.com/office/powerpoint/2010/main" Requires="p14">
+        <mc:AlternateContent xmlns:mc="http://schemas.openxmlformats.org/markup-compatibility/2006" xmlns:p14="http://schemas.microsoft.com/office/powerpoint/2010/main">
+          <mc:Choice Requires="p14">
             <p:contentPart p14:bwMode="auto" r:id="rId4">
               <p14:nvContentPartPr>
                 <p14:cNvPr id="11" name="Ink 10">
@@ -6494,7 +6494,7 @@
               </p14:xfrm>
             </p:contentPart>
           </mc:Choice>
-          <mc:Fallback>
+          <mc:Fallback xmlns="">
             <p:pic>
               <p:nvPicPr>
                 <p:cNvPr id="11" name="Ink 10">
@@ -6525,8 +6525,8 @@
             </p:pic>
           </mc:Fallback>
         </mc:AlternateContent>
-        <mc:AlternateContent xmlns:mc="http://schemas.openxmlformats.org/markup-compatibility/2006">
-          <mc:Choice xmlns:p14="http://schemas.microsoft.com/office/powerpoint/2010/main" Requires="p14">
+        <mc:AlternateContent xmlns:mc="http://schemas.openxmlformats.org/markup-compatibility/2006" xmlns:p14="http://schemas.microsoft.com/office/powerpoint/2010/main">
+          <mc:Choice Requires="p14">
             <p:contentPart p14:bwMode="auto" r:id="rId6">
               <p14:nvContentPartPr>
                 <p14:cNvPr id="12" name="Ink 11">
@@ -6545,7 +6545,7 @@
               </p14:xfrm>
             </p:contentPart>
           </mc:Choice>
-          <mc:Fallback>
+          <mc:Fallback xmlns="">
             <p:pic>
               <p:nvPicPr>
                 <p:cNvPr id="12" name="Ink 11">
@@ -6576,8 +6576,8 @@
             </p:pic>
           </mc:Fallback>
         </mc:AlternateContent>
-        <mc:AlternateContent xmlns:mc="http://schemas.openxmlformats.org/markup-compatibility/2006">
-          <mc:Choice xmlns:p14="http://schemas.microsoft.com/office/powerpoint/2010/main" Requires="p14">
+        <mc:AlternateContent xmlns:mc="http://schemas.openxmlformats.org/markup-compatibility/2006" xmlns:p14="http://schemas.microsoft.com/office/powerpoint/2010/main">
+          <mc:Choice Requires="p14">
             <p:contentPart p14:bwMode="auto" r:id="rId8">
               <p14:nvContentPartPr>
                 <p14:cNvPr id="14" name="Ink 13">
@@ -6596,7 +6596,7 @@
               </p14:xfrm>
             </p:contentPart>
           </mc:Choice>
-          <mc:Fallback>
+          <mc:Fallback xmlns="">
             <p:pic>
               <p:nvPicPr>
                 <p:cNvPr id="14" name="Ink 13">
@@ -6627,8 +6627,8 @@
             </p:pic>
           </mc:Fallback>
         </mc:AlternateContent>
-        <mc:AlternateContent xmlns:mc="http://schemas.openxmlformats.org/markup-compatibility/2006">
-          <mc:Choice xmlns:p14="http://schemas.microsoft.com/office/powerpoint/2010/main" Requires="p14">
+        <mc:AlternateContent xmlns:mc="http://schemas.openxmlformats.org/markup-compatibility/2006" xmlns:p14="http://schemas.microsoft.com/office/powerpoint/2010/main">
+          <mc:Choice Requires="p14">
             <p:contentPart p14:bwMode="auto" r:id="rId9">
               <p14:nvContentPartPr>
                 <p14:cNvPr id="15" name="Ink 14">
@@ -6647,7 +6647,7 @@
               </p14:xfrm>
             </p:contentPart>
           </mc:Choice>
-          <mc:Fallback>
+          <mc:Fallback xmlns="">
             <p:pic>
               <p:nvPicPr>
                 <p:cNvPr id="15" name="Ink 14">
@@ -6678,8 +6678,8 @@
             </p:pic>
           </mc:Fallback>
         </mc:AlternateContent>
-        <mc:AlternateContent xmlns:mc="http://schemas.openxmlformats.org/markup-compatibility/2006">
-          <mc:Choice xmlns:p14="http://schemas.microsoft.com/office/powerpoint/2010/main" Requires="p14">
+        <mc:AlternateContent xmlns:mc="http://schemas.openxmlformats.org/markup-compatibility/2006" xmlns:p14="http://schemas.microsoft.com/office/powerpoint/2010/main">
+          <mc:Choice Requires="p14">
             <p:contentPart p14:bwMode="auto" r:id="rId10">
               <p14:nvContentPartPr>
                 <p14:cNvPr id="18" name="Ink 17">
@@ -6698,7 +6698,7 @@
               </p14:xfrm>
             </p:contentPart>
           </mc:Choice>
-          <mc:Fallback>
+          <mc:Fallback xmlns="">
             <p:pic>
               <p:nvPicPr>
                 <p:cNvPr id="18" name="Ink 17">
@@ -6730,8 +6730,8 @@
           </mc:Fallback>
         </mc:AlternateContent>
       </p:grpSp>
-      <mc:AlternateContent xmlns:mc="http://schemas.openxmlformats.org/markup-compatibility/2006">
-        <mc:Choice xmlns:p14="http://schemas.microsoft.com/office/powerpoint/2010/main" Requires="p14">
+      <mc:AlternateContent xmlns:mc="http://schemas.openxmlformats.org/markup-compatibility/2006" xmlns:p14="http://schemas.microsoft.com/office/powerpoint/2010/main">
+        <mc:Choice Requires="p14">
           <p:contentPart p14:bwMode="auto" r:id="rId11">
             <p14:nvContentPartPr>
               <p14:cNvPr id="20" name="Ink 19">
@@ -6750,7 +6750,7 @@
             </p14:xfrm>
           </p:contentPart>
         </mc:Choice>
-        <mc:Fallback>
+        <mc:Fallback xmlns="">
           <p:pic>
             <p:nvPicPr>
               <p:cNvPr id="20" name="Ink 19">
@@ -6781,8 +6781,8 @@
           </p:pic>
         </mc:Fallback>
       </mc:AlternateContent>
-      <mc:AlternateContent xmlns:mc="http://schemas.openxmlformats.org/markup-compatibility/2006">
-        <mc:Choice xmlns:p14="http://schemas.microsoft.com/office/powerpoint/2010/main" Requires="p14">
+      <mc:AlternateContent xmlns:mc="http://schemas.openxmlformats.org/markup-compatibility/2006" xmlns:p14="http://schemas.microsoft.com/office/powerpoint/2010/main">
+        <mc:Choice Requires="p14">
           <p:contentPart p14:bwMode="auto" r:id="rId12">
             <p14:nvContentPartPr>
               <p14:cNvPr id="21" name="Ink 20">
@@ -6801,7 +6801,7 @@
             </p14:xfrm>
           </p:contentPart>
         </mc:Choice>
-        <mc:Fallback>
+        <mc:Fallback xmlns="">
           <p:pic>
             <p:nvPicPr>
               <p:cNvPr id="21" name="Ink 20">
@@ -6832,8 +6832,8 @@
           </p:pic>
         </mc:Fallback>
       </mc:AlternateContent>
-      <mc:AlternateContent xmlns:mc="http://schemas.openxmlformats.org/markup-compatibility/2006">
-        <mc:Choice xmlns:p14="http://schemas.microsoft.com/office/powerpoint/2010/main" Requires="p14">
+      <mc:AlternateContent xmlns:mc="http://schemas.openxmlformats.org/markup-compatibility/2006" xmlns:p14="http://schemas.microsoft.com/office/powerpoint/2010/main">
+        <mc:Choice Requires="p14">
           <p:contentPart p14:bwMode="auto" r:id="rId13">
             <p14:nvContentPartPr>
               <p14:cNvPr id="22" name="Ink 21">
@@ -6852,7 +6852,7 @@
             </p14:xfrm>
           </p:contentPart>
         </mc:Choice>
-        <mc:Fallback>
+        <mc:Fallback xmlns="">
           <p:pic>
             <p:nvPicPr>
               <p:cNvPr id="22" name="Ink 21">

</xml_diff>